<commit_message>
Updated last half of slides
</commit_message>
<xml_diff>
--- a/Phase 4 Documentation/Team_2_Presentation_4.pptx
+++ b/Phase 4 Documentation/Team_2_Presentation_4.pptx
@@ -5,7 +5,7 @@
     <p:sldMasterId id="2147483732" r:id="rId1"/>
   </p:sldMasterIdLst>
   <p:notesMasterIdLst>
-    <p:notesMasterId r:id="rId12"/>
+    <p:notesMasterId r:id="rId13"/>
   </p:notesMasterIdLst>
   <p:sldIdLst>
     <p:sldId id="256" r:id="rId2"/>
@@ -18,6 +18,7 @@
     <p:sldId id="263" r:id="rId9"/>
     <p:sldId id="264" r:id="rId10"/>
     <p:sldId id="265" r:id="rId11"/>
+    <p:sldId id="266" r:id="rId12"/>
   </p:sldIdLst>
   <p:sldSz cx="12192000" cy="6858000"/>
   <p:notesSz cx="6858000" cy="9144000"/>
@@ -4029,6 +4030,42 @@
           </a:p>
         </p:txBody>
       </p:sp>
+      <p:pic>
+        <p:nvPicPr>
+          <p:cNvPr id="7" name="Picture 6" descr="A screenshot of a computer&#10;&#10;Description automatically generated">
+            <a:extLst>
+              <a:ext uri="{FF2B5EF4-FFF2-40B4-BE49-F238E27FC236}">
+                <a16:creationId xmlns:a16="http://schemas.microsoft.com/office/drawing/2014/main" id="{F85D3EE6-1378-4664-E68D-54945CD66FA1}"/>
+              </a:ext>
+            </a:extLst>
+          </p:cNvPr>
+          <p:cNvPicPr>
+            <a:picLocks noChangeAspect="1"/>
+          </p:cNvPicPr>
+          <p:nvPr/>
+        </p:nvPicPr>
+        <p:blipFill>
+          <a:blip r:embed="rId3">
+            <a:extLst>
+              <a:ext uri="{28A0092B-C50C-407E-A947-70E740481C1C}">
+                <a14:useLocalDpi xmlns:a14="http://schemas.microsoft.com/office/drawing/2010/main" val="0"/>
+              </a:ext>
+            </a:extLst>
+          </a:blip>
+          <a:stretch>
+            <a:fillRect/>
+          </a:stretch>
+        </p:blipFill>
+        <p:spPr>
+          <a:xfrm>
+            <a:off x="5571870" y="296042"/>
+            <a:ext cx="6383910" cy="3385004"/>
+          </a:xfrm>
+          <a:prstGeom prst="rect">
+            <a:avLst/>
+          </a:prstGeom>
+        </p:spPr>
+      </p:pic>
     </p:spTree>
     <p:extLst>
       <p:ext uri="{BB962C8B-B14F-4D97-AF65-F5344CB8AC3E}">
@@ -4080,7 +4117,10 @@
           <a:bodyPr/>
           <a:lstStyle/>
           <a:p>
-            <a:endParaRPr lang="en-US"/>
+            <a:r>
+              <a:rPr lang="en-US" dirty="0"/>
+              <a:t>Live Demo</a:t>
+            </a:r>
           </a:p>
         </p:txBody>
       </p:sp>
@@ -4113,6 +4153,89 @@
     <p:extLst>
       <p:ext uri="{BB962C8B-B14F-4D97-AF65-F5344CB8AC3E}">
         <p14:creationId xmlns:p14="http://schemas.microsoft.com/office/powerpoint/2010/main" val="1134041924"/>
+      </p:ext>
+    </p:extLst>
+  </p:cSld>
+  <p:clrMapOvr>
+    <a:masterClrMapping/>
+  </p:clrMapOvr>
+</p:sld>
+</file>
+
+<file path=ppt/slides/slide11.xml><?xml version="1.0" encoding="utf-8"?>
+<p:sld xmlns:a="http://schemas.openxmlformats.org/drawingml/2006/main" xmlns:r="http://schemas.openxmlformats.org/officeDocument/2006/relationships" xmlns:p="http://schemas.openxmlformats.org/presentationml/2006/main">
+  <p:cSld>
+    <p:spTree>
+      <p:nvGrpSpPr>
+        <p:cNvPr id="1" name=""/>
+        <p:cNvGrpSpPr/>
+        <p:nvPr/>
+      </p:nvGrpSpPr>
+      <p:grpSpPr>
+        <a:xfrm>
+          <a:off x="0" y="0"/>
+          <a:ext cx="0" cy="0"/>
+          <a:chOff x="0" y="0"/>
+          <a:chExt cx="0" cy="0"/>
+        </a:xfrm>
+      </p:grpSpPr>
+      <p:sp>
+        <p:nvSpPr>
+          <p:cNvPr id="2" name="Title 1">
+            <a:extLst>
+              <a:ext uri="{FF2B5EF4-FFF2-40B4-BE49-F238E27FC236}">
+                <a16:creationId xmlns:a16="http://schemas.microsoft.com/office/drawing/2014/main" id="{0A7DF516-CB0B-8B27-D6FF-55FBC67DB194}"/>
+              </a:ext>
+            </a:extLst>
+          </p:cNvPr>
+          <p:cNvSpPr>
+            <a:spLocks noGrp="1"/>
+          </p:cNvSpPr>
+          <p:nvPr>
+            <p:ph type="title"/>
+          </p:nvPr>
+        </p:nvSpPr>
+        <p:spPr/>
+        <p:txBody>
+          <a:bodyPr/>
+          <a:lstStyle/>
+          <a:p>
+            <a:r>
+              <a:rPr lang="en-US" dirty="0"/>
+              <a:t>Questions?</a:t>
+            </a:r>
+          </a:p>
+        </p:txBody>
+      </p:sp>
+      <p:sp>
+        <p:nvSpPr>
+          <p:cNvPr id="3" name="Content Placeholder 2">
+            <a:extLst>
+              <a:ext uri="{FF2B5EF4-FFF2-40B4-BE49-F238E27FC236}">
+                <a16:creationId xmlns:a16="http://schemas.microsoft.com/office/drawing/2014/main" id="{1E5F3818-4818-BAC2-2ADC-631BD16E4179}"/>
+              </a:ext>
+            </a:extLst>
+          </p:cNvPr>
+          <p:cNvSpPr>
+            <a:spLocks noGrp="1"/>
+          </p:cNvSpPr>
+          <p:nvPr>
+            <p:ph idx="1"/>
+          </p:nvPr>
+        </p:nvSpPr>
+        <p:spPr/>
+        <p:txBody>
+          <a:bodyPr/>
+          <a:lstStyle/>
+          <a:p>
+            <a:endParaRPr lang="en-US"/>
+          </a:p>
+        </p:txBody>
+      </p:sp>
+    </p:spTree>
+    <p:extLst>
+      <p:ext uri="{BB962C8B-B14F-4D97-AF65-F5344CB8AC3E}">
+        <p14:creationId xmlns:p14="http://schemas.microsoft.com/office/powerpoint/2010/main" val="2913728262"/>
       </p:ext>
     </p:extLst>
   </p:cSld>
@@ -4940,35 +5063,48 @@
           <a:bodyPr/>
           <a:lstStyle/>
           <a:p>
-            <a:endParaRPr lang="en-US" dirty="0"/>
-          </a:p>
-        </p:txBody>
-      </p:sp>
-      <p:sp>
-        <p:nvSpPr>
-          <p:cNvPr id="3" name="Content Placeholder 2">
+            <a:r>
+              <a:rPr lang="en-US" dirty="0"/>
+              <a:t>Sign up page</a:t>
+            </a:r>
+          </a:p>
+        </p:txBody>
+      </p:sp>
+      <p:pic>
+        <p:nvPicPr>
+          <p:cNvPr id="5" name="Content Placeholder 4" descr="A screenshot of a computer&#10;&#10;Description automatically generated">
             <a:extLst>
               <a:ext uri="{FF2B5EF4-FFF2-40B4-BE49-F238E27FC236}">
-                <a16:creationId xmlns:a16="http://schemas.microsoft.com/office/drawing/2014/main" id="{6A993D87-5B3D-9073-1714-3067DFB5D404}"/>
+                <a16:creationId xmlns:a16="http://schemas.microsoft.com/office/drawing/2014/main" id="{7AF9F743-ED2E-82CC-2CC8-FBD486A4AEC6}"/>
               </a:ext>
             </a:extLst>
           </p:cNvPr>
-          <p:cNvSpPr>
-            <a:spLocks noGrp="1"/>
-          </p:cNvSpPr>
+          <p:cNvPicPr>
+            <a:picLocks noGrp="1" noChangeAspect="1"/>
+          </p:cNvPicPr>
           <p:nvPr>
             <p:ph idx="1"/>
           </p:nvPr>
-        </p:nvSpPr>
-        <p:spPr/>
-        <p:txBody>
-          <a:bodyPr/>
-          <a:lstStyle/>
-          <a:p>
-            <a:endParaRPr lang="en-US"/>
-          </a:p>
-        </p:txBody>
-      </p:sp>
+        </p:nvPicPr>
+        <p:blipFill>
+          <a:blip r:embed="rId2">
+            <a:extLst>
+              <a:ext uri="{28A0092B-C50C-407E-A947-70E740481C1C}">
+                <a14:useLocalDpi xmlns:a14="http://schemas.microsoft.com/office/drawing/2010/main" val="0"/>
+              </a:ext>
+            </a:extLst>
+          </a:blip>
+          <a:stretch>
+            <a:fillRect/>
+          </a:stretch>
+        </p:blipFill>
+        <p:spPr>
+          <a:xfrm>
+            <a:off x="2252239" y="2057400"/>
+            <a:ext cx="7654185" cy="4038600"/>
+          </a:xfrm>
+        </p:spPr>
+      </p:pic>
     </p:spTree>
     <p:extLst>
       <p:ext uri="{BB962C8B-B14F-4D97-AF65-F5344CB8AC3E}">
@@ -5020,35 +5156,84 @@
           <a:bodyPr/>
           <a:lstStyle/>
           <a:p>
-            <a:endParaRPr lang="en-US"/>
-          </a:p>
-        </p:txBody>
-      </p:sp>
-      <p:sp>
-        <p:nvSpPr>
-          <p:cNvPr id="3" name="Content Placeholder 2">
+            <a:r>
+              <a:rPr lang="en-US" dirty="0"/>
+              <a:t>Login/profile page</a:t>
+            </a:r>
+          </a:p>
+        </p:txBody>
+      </p:sp>
+      <p:pic>
+        <p:nvPicPr>
+          <p:cNvPr id="5" name="Content Placeholder 4" descr="A screenshot of a computer&#10;&#10;Description automatically generated">
             <a:extLst>
               <a:ext uri="{FF2B5EF4-FFF2-40B4-BE49-F238E27FC236}">
-                <a16:creationId xmlns:a16="http://schemas.microsoft.com/office/drawing/2014/main" id="{29CD2F27-7C9B-D008-D898-6C5B4CDF6C9F}"/>
+                <a16:creationId xmlns:a16="http://schemas.microsoft.com/office/drawing/2014/main" id="{1A9586D7-F8A7-A355-9C5C-98C7BE3C6757}"/>
               </a:ext>
             </a:extLst>
           </p:cNvPr>
-          <p:cNvSpPr>
-            <a:spLocks noGrp="1"/>
-          </p:cNvSpPr>
+          <p:cNvPicPr>
+            <a:picLocks noGrp="1" noChangeAspect="1"/>
+          </p:cNvPicPr>
           <p:nvPr>
             <p:ph idx="1"/>
           </p:nvPr>
-        </p:nvSpPr>
-        <p:spPr/>
-        <p:txBody>
-          <a:bodyPr/>
-          <a:lstStyle/>
-          <a:p>
-            <a:endParaRPr lang="en-US"/>
-          </a:p>
-        </p:txBody>
-      </p:sp>
+        </p:nvPicPr>
+        <p:blipFill>
+          <a:blip r:embed="rId2">
+            <a:extLst>
+              <a:ext uri="{28A0092B-C50C-407E-A947-70E740481C1C}">
+                <a14:useLocalDpi xmlns:a14="http://schemas.microsoft.com/office/drawing/2010/main" val="0"/>
+              </a:ext>
+            </a:extLst>
+          </a:blip>
+          <a:stretch>
+            <a:fillRect/>
+          </a:stretch>
+        </p:blipFill>
+        <p:spPr>
+          <a:xfrm>
+            <a:off x="244982" y="1965960"/>
+            <a:ext cx="5523842" cy="2926081"/>
+          </a:xfrm>
+        </p:spPr>
+      </p:pic>
+      <p:pic>
+        <p:nvPicPr>
+          <p:cNvPr id="7" name="Picture 6" descr="A screenshot of a computer&#10;&#10;Description automatically generated">
+            <a:extLst>
+              <a:ext uri="{FF2B5EF4-FFF2-40B4-BE49-F238E27FC236}">
+                <a16:creationId xmlns:a16="http://schemas.microsoft.com/office/drawing/2014/main" id="{034856D5-3F6C-18DF-164D-29B553E9EFDE}"/>
+              </a:ext>
+            </a:extLst>
+          </p:cNvPr>
+          <p:cNvPicPr>
+            <a:picLocks noChangeAspect="1"/>
+          </p:cNvPicPr>
+          <p:nvPr/>
+        </p:nvPicPr>
+        <p:blipFill>
+          <a:blip r:embed="rId3">
+            <a:extLst>
+              <a:ext uri="{28A0092B-C50C-407E-A947-70E740481C1C}">
+                <a14:useLocalDpi xmlns:a14="http://schemas.microsoft.com/office/drawing/2010/main" val="0"/>
+              </a:ext>
+            </a:extLst>
+          </a:blip>
+          <a:stretch>
+            <a:fillRect/>
+          </a:stretch>
+        </p:blipFill>
+        <p:spPr>
+          <a:xfrm>
+            <a:off x="6423178" y="1965960"/>
+            <a:ext cx="5520962" cy="2926081"/>
+          </a:xfrm>
+          <a:prstGeom prst="rect">
+            <a:avLst/>
+          </a:prstGeom>
+        </p:spPr>
+      </p:pic>
     </p:spTree>
     <p:extLst>
       <p:ext uri="{BB962C8B-B14F-4D97-AF65-F5344CB8AC3E}">
@@ -5100,35 +5285,120 @@
           <a:bodyPr/>
           <a:lstStyle/>
           <a:p>
-            <a:endParaRPr lang="en-US"/>
-          </a:p>
-        </p:txBody>
-      </p:sp>
-      <p:sp>
-        <p:nvSpPr>
-          <p:cNvPr id="3" name="Content Placeholder 2">
+            <a:r>
+              <a:rPr lang="en-US" dirty="0"/>
+              <a:t>Note pages</a:t>
+            </a:r>
+          </a:p>
+        </p:txBody>
+      </p:sp>
+      <p:pic>
+        <p:nvPicPr>
+          <p:cNvPr id="5" name="Content Placeholder 4" descr="A screenshot of a computer&#10;&#10;Description automatically generated">
             <a:extLst>
               <a:ext uri="{FF2B5EF4-FFF2-40B4-BE49-F238E27FC236}">
-                <a16:creationId xmlns:a16="http://schemas.microsoft.com/office/drawing/2014/main" id="{E88C41A7-39C0-2582-9768-BDFF8D6580BD}"/>
+                <a16:creationId xmlns:a16="http://schemas.microsoft.com/office/drawing/2014/main" id="{E51A887C-6B9B-9C27-A452-8D5914FF8FD1}"/>
               </a:ext>
             </a:extLst>
           </p:cNvPr>
-          <p:cNvSpPr>
-            <a:spLocks noGrp="1"/>
-          </p:cNvSpPr>
+          <p:cNvPicPr>
+            <a:picLocks noGrp="1" noChangeAspect="1"/>
+          </p:cNvPicPr>
           <p:nvPr>
             <p:ph idx="1"/>
           </p:nvPr>
-        </p:nvSpPr>
-        <p:spPr/>
-        <p:txBody>
-          <a:bodyPr/>
-          <a:lstStyle/>
-          <a:p>
-            <a:endParaRPr lang="en-US"/>
-          </a:p>
-        </p:txBody>
-      </p:sp>
+        </p:nvPicPr>
+        <p:blipFill>
+          <a:blip r:embed="rId2">
+            <a:extLst>
+              <a:ext uri="{28A0092B-C50C-407E-A947-70E740481C1C}">
+                <a14:useLocalDpi xmlns:a14="http://schemas.microsoft.com/office/drawing/2010/main" val="0"/>
+              </a:ext>
+            </a:extLst>
+          </a:blip>
+          <a:stretch>
+            <a:fillRect/>
+          </a:stretch>
+        </p:blipFill>
+        <p:spPr>
+          <a:xfrm>
+            <a:off x="344722" y="1965960"/>
+            <a:ext cx="4481481" cy="2373923"/>
+          </a:xfrm>
+        </p:spPr>
+      </p:pic>
+      <p:pic>
+        <p:nvPicPr>
+          <p:cNvPr id="7" name="Picture 6" descr="A screenshot of a computer&#10;&#10;Description automatically generated">
+            <a:extLst>
+              <a:ext uri="{FF2B5EF4-FFF2-40B4-BE49-F238E27FC236}">
+                <a16:creationId xmlns:a16="http://schemas.microsoft.com/office/drawing/2014/main" id="{0F510282-DB10-C03C-FB40-38E51C615D5F}"/>
+              </a:ext>
+            </a:extLst>
+          </p:cNvPr>
+          <p:cNvPicPr>
+            <a:picLocks noChangeAspect="1"/>
+          </p:cNvPicPr>
+          <p:nvPr/>
+        </p:nvPicPr>
+        <p:blipFill>
+          <a:blip r:embed="rId3">
+            <a:extLst>
+              <a:ext uri="{28A0092B-C50C-407E-A947-70E740481C1C}">
+                <a14:useLocalDpi xmlns:a14="http://schemas.microsoft.com/office/drawing/2010/main" val="0"/>
+              </a:ext>
+            </a:extLst>
+          </a:blip>
+          <a:stretch>
+            <a:fillRect/>
+          </a:stretch>
+        </p:blipFill>
+        <p:spPr>
+          <a:xfrm>
+            <a:off x="6327648" y="320997"/>
+            <a:ext cx="5519633" cy="2920973"/>
+          </a:xfrm>
+          <a:prstGeom prst="rect">
+            <a:avLst/>
+          </a:prstGeom>
+        </p:spPr>
+      </p:pic>
+      <p:pic>
+        <p:nvPicPr>
+          <p:cNvPr id="9" name="Picture 8" descr="A screenshot of a computer&#10;&#10;Description automatically generated">
+            <a:extLst>
+              <a:ext uri="{FF2B5EF4-FFF2-40B4-BE49-F238E27FC236}">
+                <a16:creationId xmlns:a16="http://schemas.microsoft.com/office/drawing/2014/main" id="{BDD12FDF-E2C2-BB87-6254-CF9F07A3D80B}"/>
+              </a:ext>
+            </a:extLst>
+          </p:cNvPr>
+          <p:cNvPicPr>
+            <a:picLocks noChangeAspect="1"/>
+          </p:cNvPicPr>
+          <p:nvPr/>
+        </p:nvPicPr>
+        <p:blipFill>
+          <a:blip r:embed="rId4">
+            <a:extLst>
+              <a:ext uri="{28A0092B-C50C-407E-A947-70E740481C1C}">
+                <a14:useLocalDpi xmlns:a14="http://schemas.microsoft.com/office/drawing/2010/main" val="0"/>
+              </a:ext>
+            </a:extLst>
+          </a:blip>
+          <a:stretch>
+            <a:fillRect/>
+          </a:stretch>
+        </p:blipFill>
+        <p:spPr>
+          <a:xfrm>
+            <a:off x="6096000" y="3429000"/>
+            <a:ext cx="6096000" cy="3232342"/>
+          </a:xfrm>
+          <a:prstGeom prst="rect">
+            <a:avLst/>
+          </a:prstGeom>
+        </p:spPr>
+      </p:pic>
     </p:spTree>
     <p:extLst>
       <p:ext uri="{BB962C8B-B14F-4D97-AF65-F5344CB8AC3E}">
@@ -5180,35 +5450,48 @@
           <a:bodyPr/>
           <a:lstStyle/>
           <a:p>
-            <a:endParaRPr lang="en-US" dirty="0"/>
-          </a:p>
-        </p:txBody>
-      </p:sp>
-      <p:sp>
-        <p:nvSpPr>
-          <p:cNvPr id="3" name="Content Placeholder 2">
+            <a:r>
+              <a:rPr lang="en-US" dirty="0"/>
+              <a:t>Announcements</a:t>
+            </a:r>
+          </a:p>
+        </p:txBody>
+      </p:sp>
+      <p:pic>
+        <p:nvPicPr>
+          <p:cNvPr id="5" name="Content Placeholder 4" descr="A screenshot of a computer&#10;&#10;Description automatically generated">
             <a:extLst>
               <a:ext uri="{FF2B5EF4-FFF2-40B4-BE49-F238E27FC236}">
-                <a16:creationId xmlns:a16="http://schemas.microsoft.com/office/drawing/2014/main" id="{17D7A9FE-65F0-5367-CAAB-997AC4A85D33}"/>
+                <a16:creationId xmlns:a16="http://schemas.microsoft.com/office/drawing/2014/main" id="{B337D6AC-623C-AE07-7566-E8497D1B951B}"/>
               </a:ext>
             </a:extLst>
           </p:cNvPr>
-          <p:cNvSpPr>
-            <a:spLocks noGrp="1"/>
-          </p:cNvSpPr>
+          <p:cNvPicPr>
+            <a:picLocks noGrp="1" noChangeAspect="1"/>
+          </p:cNvPicPr>
           <p:nvPr>
             <p:ph idx="1"/>
           </p:nvPr>
-        </p:nvSpPr>
-        <p:spPr/>
-        <p:txBody>
-          <a:bodyPr/>
-          <a:lstStyle/>
-          <a:p>
-            <a:endParaRPr lang="en-US"/>
-          </a:p>
-        </p:txBody>
-      </p:sp>
+        </p:nvPicPr>
+        <p:blipFill>
+          <a:blip r:embed="rId2">
+            <a:extLst>
+              <a:ext uri="{28A0092B-C50C-407E-A947-70E740481C1C}">
+                <a14:useLocalDpi xmlns:a14="http://schemas.microsoft.com/office/drawing/2010/main" val="0"/>
+              </a:ext>
+            </a:extLst>
+          </a:blip>
+          <a:stretch>
+            <a:fillRect/>
+          </a:stretch>
+        </p:blipFill>
+        <p:spPr>
+          <a:xfrm>
+            <a:off x="2252239" y="2057400"/>
+            <a:ext cx="7654185" cy="4038600"/>
+          </a:xfrm>
+        </p:spPr>
+      </p:pic>
     </p:spTree>
     <p:extLst>
       <p:ext uri="{BB962C8B-B14F-4D97-AF65-F5344CB8AC3E}">

</xml_diff>

<commit_message>
proofread phase 4 presentation, made some minor corrections
</commit_message>
<xml_diff>
--- a/Phase 4 Documentation/Team_2_Presentation_4.pptx
+++ b/Phase 4 Documentation/Team_2_Presentation_4.pptx
@@ -4784,7 +4784,11 @@
           <a:lstStyle/>
           <a:p>
             <a:r>
-              <a:rPr lang="en-US" sz="4000"/>
+              <a:rPr lang="en-US" sz="4000" dirty="0">
+                <a:solidFill>
+                  <a:srgbClr val="002060"/>
+                </a:solidFill>
+              </a:rPr>
               <a:t>What is it?</a:t>
             </a:r>
           </a:p>
@@ -5007,7 +5011,7 @@
           <a:lstStyle/>
           <a:p>
             <a:r>
-              <a:rPr lang="en-US">
+              <a:rPr lang="en-US" dirty="0">
                 <a:solidFill>
                   <a:srgbClr val="FFFFFF"/>
                 </a:solidFill>
@@ -5070,7 +5074,7 @@
         </p:nvSpPr>
         <p:spPr>
           <a:xfrm>
-            <a:off x="4441783" y="2057400"/>
+            <a:off x="4441783" y="2819400"/>
             <a:ext cx="6693061" cy="4038600"/>
           </a:xfrm>
         </p:spPr>
@@ -5080,46 +5084,72 @@
           </a:bodyPr>
           <a:lstStyle/>
           <a:p>
+            <a:pPr>
+              <a:buClr>
+                <a:schemeClr val="accent2">
+                  <a:lumMod val="50000"/>
+                </a:schemeClr>
+              </a:buClr>
+              <a:buFont typeface="Wingdings" panose="05000000000000000000" pitchFamily="2" charset="2"/>
+              <a:buChar char="ü"/>
+            </a:pPr>
             <a:r>
               <a:rPr lang="en-US" sz="2600" dirty="0">
                 <a:solidFill>
                   <a:srgbClr val="FFFFFF"/>
                 </a:solidFill>
               </a:rPr>
-              <a:t>It’s a website, because we thought it was the best place to have</a:t>
-            </a:r>
-          </a:p>
-          <a:p>
+              <a:t>Easily accessible</a:t>
+            </a:r>
+          </a:p>
+          <a:p>
+            <a:pPr>
+              <a:buClr>
+                <a:schemeClr val="accent2">
+                  <a:lumMod val="50000"/>
+                </a:schemeClr>
+              </a:buClr>
+              <a:buFont typeface="Wingdings" panose="05000000000000000000" pitchFamily="2" charset="2"/>
+              <a:buChar char="ü"/>
+            </a:pPr>
             <a:r>
               <a:rPr lang="en-US" sz="2600" dirty="0">
                 <a:solidFill>
                   <a:srgbClr val="FFFFFF"/>
                 </a:solidFill>
               </a:rPr>
-              <a:t>No, downloading needed</a:t>
-            </a:r>
-          </a:p>
-          <a:p>
+              <a:t>No downloads </a:t>
+            </a:r>
+          </a:p>
+          <a:p>
+            <a:pPr>
+              <a:buClr>
+                <a:schemeClr val="accent2">
+                  <a:lumMod val="50000"/>
+                </a:schemeClr>
+              </a:buClr>
+              <a:buFont typeface="Wingdings" panose="05000000000000000000" pitchFamily="2" charset="2"/>
+              <a:buChar char="ü"/>
+            </a:pPr>
             <a:r>
               <a:rPr lang="en-US" sz="2600" dirty="0">
                 <a:solidFill>
                   <a:srgbClr val="FFFFFF"/>
                 </a:solidFill>
               </a:rPr>
-              <a:t>It allows for easy access </a:t>
-            </a:r>
-          </a:p>
-          <a:p>
-            <a:r>
-              <a:rPr lang="en-US" sz="2600" dirty="0">
-                <a:solidFill>
-                  <a:srgbClr val="FFFFFF"/>
-                </a:solidFill>
-              </a:rPr>
-              <a:t>It gave us a good environment to develop and create our application</a:t>
-            </a:r>
-          </a:p>
-          <a:p>
+              <a:t>It is a good environment to develop and create our application.</a:t>
+            </a:r>
+          </a:p>
+          <a:p>
+            <a:pPr>
+              <a:buClr>
+                <a:schemeClr val="accent2">
+                  <a:lumMod val="50000"/>
+                </a:schemeClr>
+              </a:buClr>
+              <a:buFont typeface="Wingdings" panose="05000000000000000000" pitchFamily="2" charset="2"/>
+              <a:buChar char="ü"/>
+            </a:pPr>
             <a:endParaRPr lang="en-US" sz="2600" dirty="0">
               <a:solidFill>
                 <a:srgbClr val="FFFFFF"/>
@@ -5236,13 +5266,22 @@
             <p:ph type="title"/>
           </p:nvPr>
         </p:nvSpPr>
-        <p:spPr/>
+        <p:spPr>
+          <a:xfrm>
+            <a:off x="1158240" y="742950"/>
+            <a:ext cx="9875520" cy="1356360"/>
+          </a:xfrm>
+        </p:spPr>
         <p:txBody>
           <a:bodyPr/>
           <a:lstStyle/>
           <a:p>
             <a:r>
-              <a:rPr lang="en-US" dirty="0"/>
+              <a:rPr lang="en-US" dirty="0">
+                <a:solidFill>
+                  <a:srgbClr val="002060"/>
+                </a:solidFill>
+              </a:rPr>
               <a:t>Key Features</a:t>
             </a:r>
           </a:p>
@@ -5264,9 +5303,14 @@
             <p:ph idx="1"/>
           </p:nvPr>
         </p:nvSpPr>
-        <p:spPr/>
-        <p:txBody>
-          <a:bodyPr/>
+        <p:spPr>
+          <a:xfrm>
+            <a:off x="1005840" y="1543050"/>
+            <a:ext cx="9872871" cy="4038600"/>
+          </a:xfrm>
+        </p:spPr>
+        <p:txBody>
+          <a:bodyPr anchor="b"/>
           <a:lstStyle/>
           <a:p>
             <a:r>
@@ -5434,22 +5478,6 @@
               <a:t>Decrypted upon access from database</a:t>
             </a:r>
           </a:p>
-          <a:p>
-            <a:r>
-              <a:rPr lang="en-US" sz="2600" dirty="0"/>
-              <a:t>AI Integration</a:t>
-            </a:r>
-          </a:p>
-          <a:p>
-            <a:pPr lvl="1"/>
-            <a:r>
-              <a:rPr lang="en-US" sz="2600" dirty="0"/>
-              <a:t>AI powered note categorization with Google</a:t>
-            </a:r>
-          </a:p>
-          <a:p>
-            <a:endParaRPr lang="en-US" dirty="0"/>
-          </a:p>
         </p:txBody>
       </p:sp>
     </p:spTree>
@@ -5537,17 +5565,26 @@
           <a:lstStyle/>
           <a:p>
             <a:r>
-              <a:rPr lang="en-US" dirty="0"/>
+              <a:rPr lang="en-US" sz="2400" dirty="0"/>
               <a:t>Powerful </a:t>
             </a:r>
             <a:r>
-              <a:rPr lang="en-US" dirty="0" err="1"/>
+              <a:rPr lang="en-US" sz="2400" dirty="0" err="1"/>
               <a:t>TinyMCE</a:t>
             </a:r>
             <a:r>
-              <a:rPr lang="en-US" dirty="0"/>
-              <a:t> Editor utilized for create, edit, and view</a:t>
-            </a:r>
+              <a:rPr lang="en-US" sz="2400" dirty="0"/>
+              <a:t> Editor utilized to create, edit, and view</a:t>
+            </a:r>
+          </a:p>
+          <a:p>
+            <a:r>
+              <a:rPr lang="en-US" sz="2400" dirty="0"/>
+              <a:t>AI powered note categorization with Google</a:t>
+            </a:r>
+          </a:p>
+          <a:p>
+            <a:endParaRPr lang="en-US" dirty="0"/>
           </a:p>
         </p:txBody>
       </p:sp>
@@ -5710,17 +5747,10 @@
         </p:spPr>
         <p:txBody>
           <a:bodyPr vert="horz" lIns="91440" tIns="45720" rIns="91440" bIns="45720" rtlCol="0" anchor="ctr">
-            <a:normAutofit fontScale="90000"/>
+            <a:normAutofit/>
           </a:bodyPr>
           <a:lstStyle/>
           <a:p>
-            <a:r>
-              <a:rPr lang="en-US" dirty="0"/>
-              <a:t>Unique Features</a:t>
-            </a:r>
-            <a:br>
-              <a:rPr lang="en-US" dirty="0"/>
-            </a:br>
             <a:r>
               <a:rPr lang="en-US" dirty="0"/>
               <a:t>Sign Up Page</a:t>

</xml_diff>